<commit_message>
Move dash connect and interact
</commit_message>
<xml_diff>
--- a/DSX/Lab-2/Categorizing-Introduction.pptx
+++ b/DSX/Lab-2/Categorizing-Introduction.pptx
@@ -320,7 +320,7 @@
               <a:pPr>
                 <a:defRPr/>
               </a:pPr>
-              <a:t>3/24/17</a:t>
+              <a:t>3/27/17</a:t>
             </a:fld>
             <a:endParaRPr lang="en-US" altLang="en-US"/>
           </a:p>
@@ -8201,7 +8201,7 @@
           <a:p>
             <a:fld id="{88C5A43A-D7F1-2D40-88D0-9AFC21143301}" type="datetime1">
               <a:rPr lang="en-US" smtClean="0"/>
-              <a:t>3/24/17</a:t>
+              <a:t>3/27/17</a:t>
             </a:fld>
             <a:endParaRPr lang="en-US" dirty="0"/>
           </a:p>
@@ -11564,7 +11564,7 @@
           <a:p>
             <a:fld id="{370407F8-A0DE-0548-8524-82115295947F}" type="datetime1">
               <a:rPr lang="en-US" smtClean="0"/>
-              <a:t>3/24/17</a:t>
+              <a:t>3/27/17</a:t>
             </a:fld>
             <a:endParaRPr lang="en-US" dirty="0"/>
           </a:p>
@@ -11720,7 +11720,7 @@
           <a:p>
             <a:fld id="{2862B59D-61C6-734D-B2FA-82ADFB6FECA2}" type="datetime1">
               <a:rPr lang="en-US" noProof="0" smtClean="0"/>
-              <a:t>3/24/17</a:t>
+              <a:t>3/27/17</a:t>
             </a:fld>
             <a:endParaRPr lang="en-US" noProof="0" dirty="0"/>
           </a:p>
@@ -12005,7 +12005,7 @@
           <a:p>
             <a:fld id="{2406264F-D4B1-EC4C-8C30-7F9F0D21D144}" type="datetime1">
               <a:rPr lang="en-US" smtClean="0"/>
-              <a:t>3/24/17</a:t>
+              <a:t>3/27/17</a:t>
             </a:fld>
             <a:endParaRPr lang="en-US" dirty="0"/>
           </a:p>
@@ -12243,7 +12243,7 @@
           <a:p>
             <a:fld id="{D2AADFED-D696-B14C-9F9D-4B709DB04A57}" type="datetime1">
               <a:rPr lang="en-US" smtClean="0"/>
-              <a:t>3/24/17</a:t>
+              <a:t>3/27/17</a:t>
             </a:fld>
             <a:endParaRPr lang="en-US" dirty="0"/>
           </a:p>
@@ -12537,7 +12537,7 @@
           <a:p>
             <a:fld id="{294C0549-033F-F04E-8BB8-1B3E52F5B6D7}" type="datetime1">
               <a:rPr lang="en-US" smtClean="0"/>
-              <a:t>3/24/17</a:t>
+              <a:t>3/27/17</a:t>
             </a:fld>
             <a:endParaRPr lang="en-US" dirty="0"/>
           </a:p>
@@ -12831,7 +12831,7 @@
           <a:p>
             <a:fld id="{DC020AAE-0E93-0646-88F8-B04482CD4A2C}" type="datetime1">
               <a:rPr lang="en-US" smtClean="0"/>
-              <a:t>3/24/17</a:t>
+              <a:t>3/27/17</a:t>
             </a:fld>
             <a:endParaRPr lang="en-US" dirty="0"/>
           </a:p>
@@ -13044,7 +13044,7 @@
           <a:p>
             <a:fld id="{91B44213-F620-F24C-A685-23884068C705}" type="datetime1">
               <a:rPr lang="en-US" smtClean="0"/>
-              <a:t>3/24/17</a:t>
+              <a:t>3/27/17</a:t>
             </a:fld>
             <a:endParaRPr lang="en-US" dirty="0"/>
           </a:p>
@@ -13230,7 +13230,7 @@
           <a:p>
             <a:fld id="{812CE4DF-5C59-FE41-87D9-FA30C439C712}" type="datetime1">
               <a:rPr lang="en-US" smtClean="0"/>
-              <a:t>3/24/17</a:t>
+              <a:t>3/27/17</a:t>
             </a:fld>
             <a:endParaRPr lang="en-US" dirty="0"/>
           </a:p>
@@ -13488,7 +13488,7 @@
           <a:p>
             <a:fld id="{0F2A9B07-2AD9-E04E-96EB-52640D3CE50E}" type="datetime1">
               <a:rPr lang="en-US" smtClean="0"/>
-              <a:t>3/24/17</a:t>
+              <a:t>3/27/17</a:t>
             </a:fld>
             <a:endParaRPr lang="en-US" dirty="0"/>
           </a:p>
@@ -14194,7 +14194,7 @@
           <a:p>
             <a:fld id="{C0E938FE-645F-2E40-8F8E-5332AAB7C030}" type="datetime1">
               <a:rPr lang="en-US" smtClean="0"/>
-              <a:t>3/24/17</a:t>
+              <a:t>3/27/17</a:t>
             </a:fld>
             <a:endParaRPr lang="en-US" dirty="0"/>
           </a:p>
@@ -14756,7 +14756,7 @@
           <a:p>
             <a:fld id="{F6569909-79EB-CD48-8A4A-5A8D23B2CF35}" type="datetime1">
               <a:rPr lang="en-US" smtClean="0"/>
-              <a:t>3/24/17</a:t>
+              <a:t>3/27/17</a:t>
             </a:fld>
             <a:endParaRPr lang="en-US" dirty="0"/>
           </a:p>
@@ -14942,7 +14942,7 @@
           <a:p>
             <a:fld id="{5F360B42-63B9-304D-8F7B-BA1B289E486A}" type="datetime1">
               <a:rPr lang="en-US" smtClean="0"/>
-              <a:t>3/24/17</a:t>
+              <a:t>3/27/17</a:t>
             </a:fld>
             <a:endParaRPr lang="en-US" dirty="0"/>
           </a:p>
@@ -15274,7 +15274,7 @@
           <a:p>
             <a:fld id="{B3CCD755-ADF0-0247-AFB5-091D593A0B30}" type="datetime1">
               <a:rPr lang="en-US" smtClean="0"/>
-              <a:t>3/24/17</a:t>
+              <a:t>3/27/17</a:t>
             </a:fld>
             <a:endParaRPr lang="en-US" dirty="0"/>
           </a:p>
@@ -15476,7 +15476,7 @@
           <a:p>
             <a:fld id="{BEC3198B-BFB2-B34A-8309-8E316F54C5CC}" type="datetime1">
               <a:rPr lang="en-US" smtClean="0"/>
-              <a:t>3/24/17</a:t>
+              <a:t>3/27/17</a:t>
             </a:fld>
             <a:endParaRPr lang="en-US" dirty="0"/>
           </a:p>
@@ -15651,7 +15651,7 @@
           <a:p>
             <a:fld id="{506DB83D-5CC2-DC41-9EA7-60FEADFFDA17}" type="datetime1">
               <a:rPr lang="en-US" smtClean="0"/>
-              <a:t>3/24/17</a:t>
+              <a:t>3/27/17</a:t>
             </a:fld>
             <a:endParaRPr lang="en-US" dirty="0"/>
           </a:p>
@@ -15898,7 +15898,7 @@
           <a:p>
             <a:fld id="{8B4D88E6-5C8B-214B-93C3-5859175EB588}" type="datetime1">
               <a:rPr lang="en-US" smtClean="0"/>
-              <a:t>3/24/17</a:t>
+              <a:t>3/27/17</a:t>
             </a:fld>
             <a:endParaRPr lang="en-US" dirty="0"/>
           </a:p>
@@ -16228,7 +16228,7 @@
           <a:p>
             <a:fld id="{44AA6E10-E411-A240-A338-B3A6E7C88E29}" type="datetime1">
               <a:rPr lang="en-US" smtClean="0"/>
-              <a:t>3/24/17</a:t>
+              <a:t>3/27/17</a:t>
             </a:fld>
             <a:endParaRPr lang="en-US" dirty="0"/>
           </a:p>
@@ -16387,7 +16387,7 @@
           <a:p>
             <a:fld id="{F9201628-924E-6947-8103-D29E7F24B145}" type="datetime1">
               <a:rPr lang="en-US" smtClean="0"/>
-              <a:t>3/24/17</a:t>
+              <a:t>3/27/17</a:t>
             </a:fld>
             <a:endParaRPr lang="en-US" dirty="0"/>
           </a:p>
@@ -16577,7 +16577,7 @@
           <a:p>
             <a:fld id="{010DB504-C20C-814E-9B71-5D4A32B33569}" type="datetime1">
               <a:rPr lang="en-US" smtClean="0"/>
-              <a:t>3/24/17</a:t>
+              <a:t>3/27/17</a:t>
             </a:fld>
             <a:endParaRPr lang="en-US" dirty="0"/>
           </a:p>
@@ -16711,7 +16711,7 @@
           <a:p>
             <a:fld id="{E49DF524-3F05-984E-8D5A-A74FF9189340}" type="datetime1">
               <a:rPr lang="en-US" smtClean="0"/>
-              <a:t>3/24/17</a:t>
+              <a:t>3/27/17</a:t>
             </a:fld>
             <a:endParaRPr lang="en-US" dirty="0"/>
           </a:p>
@@ -16848,7 +16848,7 @@
           <a:p>
             <a:fld id="{32CC8613-32AD-954C-8052-A3A192382257}" type="datetime1">
               <a:rPr lang="en-US" smtClean="0"/>
-              <a:t>3/24/17</a:t>
+              <a:t>3/27/17</a:t>
             </a:fld>
             <a:endParaRPr lang="en-US" dirty="0"/>
           </a:p>
@@ -16982,7 +16982,7 @@
           <a:p>
             <a:fld id="{E89997A2-0882-9A41-B5BB-6ECC9567DA24}" type="datetime1">
               <a:rPr lang="en-US" smtClean="0"/>
-              <a:t>3/24/17</a:t>
+              <a:t>3/27/17</a:t>
             </a:fld>
             <a:endParaRPr lang="en-US" dirty="0"/>
           </a:p>
@@ -19384,7 +19384,7 @@
           <a:p>
             <a:fld id="{2174344F-C90D-A449-8092-23260DC06A0F}" type="datetime1">
               <a:rPr lang="en-US" smtClean="0"/>
-              <a:t>3/24/17</a:t>
+              <a:t>3/27/17</a:t>
             </a:fld>
             <a:endParaRPr lang="en-US" dirty="0"/>
           </a:p>
@@ -19803,7 +19803,7 @@
           <a:graphicData uri="http://schemas.openxmlformats.org/presentationml/2006/ole">
             <mc:AlternateContent xmlns:mc="http://schemas.openxmlformats.org/markup-compatibility/2006">
               <mc:Choice xmlns:v="urn:schemas-microsoft-com:vml" Requires="v">
-                <p:oleObj spid="_x0000_s5303" name="think-cell Slide" r:id="rId5" imgW="38100" imgH="38100" progId="TCLayout.ActiveDocument.1">
+                <p:oleObj spid="_x0000_s5305" name="think-cell Slide" r:id="rId5" imgW="38100" imgH="38100" progId="TCLayout.ActiveDocument.1">
                   <p:embed/>
                 </p:oleObj>
               </mc:Choice>
@@ -20473,21 +20473,21 @@
                 <a:gridCol w="1679636">
                   <a:extLst>
                     <a:ext uri="{9D8B030D-6E8A-4147-A177-3AD203B41FA5}">
-                      <a16:colId xmlns="" xmlns:a16="http://schemas.microsoft.com/office/drawing/2014/main" val="20000"/>
+                      <a16:colId xmlns:a16="http://schemas.microsoft.com/office/drawing/2014/main" xmlns="" val="20000"/>
                     </a:ext>
                   </a:extLst>
                 </a:gridCol>
                 <a:gridCol w="3513044">
                   <a:extLst>
                     <a:ext uri="{9D8B030D-6E8A-4147-A177-3AD203B41FA5}">
-                      <a16:colId xmlns="" xmlns:a16="http://schemas.microsoft.com/office/drawing/2014/main" val="3060790854"/>
+                      <a16:colId xmlns:a16="http://schemas.microsoft.com/office/drawing/2014/main" xmlns="" val="3060790854"/>
                     </a:ext>
                   </a:extLst>
                 </a:gridCol>
                 <a:gridCol w="3046252">
                   <a:extLst>
                     <a:ext uri="{9D8B030D-6E8A-4147-A177-3AD203B41FA5}">
-                      <a16:colId xmlns="" xmlns:a16="http://schemas.microsoft.com/office/drawing/2014/main" val="20001"/>
+                      <a16:colId xmlns:a16="http://schemas.microsoft.com/office/drawing/2014/main" xmlns="" val="20001"/>
                     </a:ext>
                   </a:extLst>
                 </a:gridCol>
@@ -20577,7 +20577,7 @@
                 </a:tc>
                 <a:extLst>
                   <a:ext uri="{0D108BD9-81ED-4DB2-BD59-A6C34878D82A}">
-                    <a16:rowId xmlns="" xmlns:a16="http://schemas.microsoft.com/office/drawing/2014/main" val="10000"/>
+                    <a16:rowId xmlns:a16="http://schemas.microsoft.com/office/drawing/2014/main" xmlns="" val="10000"/>
                   </a:ext>
                 </a:extLst>
               </a:tr>
@@ -21184,7 +21184,7 @@
                 </a:tc>
                 <a:extLst>
                   <a:ext uri="{0D108BD9-81ED-4DB2-BD59-A6C34878D82A}">
-                    <a16:rowId xmlns="" xmlns:a16="http://schemas.microsoft.com/office/drawing/2014/main" val="10001"/>
+                    <a16:rowId xmlns:a16="http://schemas.microsoft.com/office/drawing/2014/main" xmlns="" val="10001"/>
                   </a:ext>
                 </a:extLst>
               </a:tr>
@@ -21845,7 +21845,7 @@
                 </a:tc>
                 <a:extLst>
                   <a:ext uri="{0D108BD9-81ED-4DB2-BD59-A6C34878D82A}">
-                    <a16:rowId xmlns="" xmlns:a16="http://schemas.microsoft.com/office/drawing/2014/main" val="10002"/>
+                    <a16:rowId xmlns:a16="http://schemas.microsoft.com/office/drawing/2014/main" xmlns="" val="10002"/>
                   </a:ext>
                 </a:extLst>
               </a:tr>
@@ -21933,21 +21933,21 @@
                 <a:gridCol w="1679636">
                   <a:extLst>
                     <a:ext uri="{9D8B030D-6E8A-4147-A177-3AD203B41FA5}">
-                      <a16:colId xmlns="" xmlns:a16="http://schemas.microsoft.com/office/drawing/2014/main" val="20000"/>
+                      <a16:colId xmlns:a16="http://schemas.microsoft.com/office/drawing/2014/main" xmlns="" val="20000"/>
                     </a:ext>
                   </a:extLst>
                 </a:gridCol>
                 <a:gridCol w="3513044">
                   <a:extLst>
                     <a:ext uri="{9D8B030D-6E8A-4147-A177-3AD203B41FA5}">
-                      <a16:colId xmlns="" xmlns:a16="http://schemas.microsoft.com/office/drawing/2014/main" val="3060790854"/>
+                      <a16:colId xmlns:a16="http://schemas.microsoft.com/office/drawing/2014/main" xmlns="" val="3060790854"/>
                     </a:ext>
                   </a:extLst>
                 </a:gridCol>
                 <a:gridCol w="3046252">
                   <a:extLst>
                     <a:ext uri="{9D8B030D-6E8A-4147-A177-3AD203B41FA5}">
-                      <a16:colId xmlns="" xmlns:a16="http://schemas.microsoft.com/office/drawing/2014/main" val="20001"/>
+                      <a16:colId xmlns:a16="http://schemas.microsoft.com/office/drawing/2014/main" xmlns="" val="20001"/>
                     </a:ext>
                   </a:extLst>
                 </a:gridCol>
@@ -22037,7 +22037,7 @@
                 </a:tc>
                 <a:extLst>
                   <a:ext uri="{0D108BD9-81ED-4DB2-BD59-A6C34878D82A}">
-                    <a16:rowId xmlns="" xmlns:a16="http://schemas.microsoft.com/office/drawing/2014/main" val="10000"/>
+                    <a16:rowId xmlns:a16="http://schemas.microsoft.com/office/drawing/2014/main" xmlns="" val="10000"/>
                   </a:ext>
                 </a:extLst>
               </a:tr>
@@ -22910,7 +22910,7 @@
                 </a:tc>
                 <a:extLst>
                   <a:ext uri="{0D108BD9-81ED-4DB2-BD59-A6C34878D82A}">
-                    <a16:rowId xmlns="" xmlns:a16="http://schemas.microsoft.com/office/drawing/2014/main" val="10001"/>
+                    <a16:rowId xmlns:a16="http://schemas.microsoft.com/office/drawing/2014/main" xmlns="" val="10001"/>
                   </a:ext>
                 </a:extLst>
               </a:tr>
@@ -23535,7 +23535,7 @@
                 </a:tc>
                 <a:extLst>
                   <a:ext uri="{0D108BD9-81ED-4DB2-BD59-A6C34878D82A}">
-                    <a16:rowId xmlns="" xmlns:a16="http://schemas.microsoft.com/office/drawing/2014/main" val="10002"/>
+                    <a16:rowId xmlns:a16="http://schemas.microsoft.com/office/drawing/2014/main" xmlns="" val="10002"/>
                   </a:ext>
                 </a:extLst>
               </a:tr>
@@ -26123,14 +26123,14 @@
                 <a:gridCol w="3048000">
                   <a:extLst>
                     <a:ext uri="{9D8B030D-6E8A-4147-A177-3AD203B41FA5}">
-                      <a16:colId xmlns="" xmlns:a16="http://schemas.microsoft.com/office/drawing/2014/main" val="2590453470"/>
+                      <a16:colId xmlns:a16="http://schemas.microsoft.com/office/drawing/2014/main" xmlns="" val="2590453470"/>
                     </a:ext>
                   </a:extLst>
                 </a:gridCol>
                 <a:gridCol w="3048000">
                   <a:extLst>
                     <a:ext uri="{9D8B030D-6E8A-4147-A177-3AD203B41FA5}">
-                      <a16:colId xmlns="" xmlns:a16="http://schemas.microsoft.com/office/drawing/2014/main" val="863222546"/>
+                      <a16:colId xmlns:a16="http://schemas.microsoft.com/office/drawing/2014/main" xmlns="" val="863222546"/>
                     </a:ext>
                   </a:extLst>
                 </a:gridCol>
@@ -26172,7 +26172,7 @@
                 </a:tc>
                 <a:extLst>
                   <a:ext uri="{0D108BD9-81ED-4DB2-BD59-A6C34878D82A}">
-                    <a16:rowId xmlns="" xmlns:a16="http://schemas.microsoft.com/office/drawing/2014/main" val="824732163"/>
+                    <a16:rowId xmlns:a16="http://schemas.microsoft.com/office/drawing/2014/main" xmlns="" val="824732163"/>
                   </a:ext>
                 </a:extLst>
               </a:tr>
@@ -26205,7 +26205,7 @@
                 </a:tc>
                 <a:extLst>
                   <a:ext uri="{0D108BD9-81ED-4DB2-BD59-A6C34878D82A}">
-                    <a16:rowId xmlns="" xmlns:a16="http://schemas.microsoft.com/office/drawing/2014/main" val="91677113"/>
+                    <a16:rowId xmlns:a16="http://schemas.microsoft.com/office/drawing/2014/main" xmlns="" val="91677113"/>
                   </a:ext>
                 </a:extLst>
               </a:tr>
@@ -26238,7 +26238,7 @@
                 </a:tc>
                 <a:extLst>
                   <a:ext uri="{0D108BD9-81ED-4DB2-BD59-A6C34878D82A}">
-                    <a16:rowId xmlns="" xmlns:a16="http://schemas.microsoft.com/office/drawing/2014/main" val="592803785"/>
+                    <a16:rowId xmlns:a16="http://schemas.microsoft.com/office/drawing/2014/main" xmlns="" val="592803785"/>
                   </a:ext>
                 </a:extLst>
               </a:tr>
@@ -26271,7 +26271,7 @@
                 </a:tc>
                 <a:extLst>
                   <a:ext uri="{0D108BD9-81ED-4DB2-BD59-A6C34878D82A}">
-                    <a16:rowId xmlns="" xmlns:a16="http://schemas.microsoft.com/office/drawing/2014/main" val="464157001"/>
+                    <a16:rowId xmlns:a16="http://schemas.microsoft.com/office/drawing/2014/main" xmlns="" val="464157001"/>
                   </a:ext>
                 </a:extLst>
               </a:tr>
@@ -26304,7 +26304,7 @@
                 </a:tc>
                 <a:extLst>
                   <a:ext uri="{0D108BD9-81ED-4DB2-BD59-A6C34878D82A}">
-                    <a16:rowId xmlns="" xmlns:a16="http://schemas.microsoft.com/office/drawing/2014/main" val="1264193907"/>
+                    <a16:rowId xmlns:a16="http://schemas.microsoft.com/office/drawing/2014/main" xmlns="" val="1264193907"/>
                   </a:ext>
                 </a:extLst>
               </a:tr>
@@ -26337,7 +26337,7 @@
                 </a:tc>
                 <a:extLst>
                   <a:ext uri="{0D108BD9-81ED-4DB2-BD59-A6C34878D82A}">
-                    <a16:rowId xmlns="" xmlns:a16="http://schemas.microsoft.com/office/drawing/2014/main" val="1932704166"/>
+                    <a16:rowId xmlns:a16="http://schemas.microsoft.com/office/drawing/2014/main" xmlns="" val="1932704166"/>
                   </a:ext>
                 </a:extLst>
               </a:tr>
@@ -26378,7 +26378,7 @@
                 </a:tc>
                 <a:extLst>
                   <a:ext uri="{0D108BD9-81ED-4DB2-BD59-A6C34878D82A}">
-                    <a16:rowId xmlns="" xmlns:a16="http://schemas.microsoft.com/office/drawing/2014/main" val="3978776233"/>
+                    <a16:rowId xmlns:a16="http://schemas.microsoft.com/office/drawing/2014/main" xmlns="" val="3978776233"/>
                   </a:ext>
                 </a:extLst>
               </a:tr>
@@ -38295,35 +38295,35 @@
                 <a:gridCol w="1219200">
                   <a:extLst>
                     <a:ext uri="{9D8B030D-6E8A-4147-A177-3AD203B41FA5}">
-                      <a16:colId xmlns="" xmlns:a16="http://schemas.microsoft.com/office/drawing/2014/main" val="3480544745"/>
+                      <a16:colId xmlns:a16="http://schemas.microsoft.com/office/drawing/2014/main" xmlns="" val="3480544745"/>
                     </a:ext>
                   </a:extLst>
                 </a:gridCol>
                 <a:gridCol w="1219200">
                   <a:extLst>
                     <a:ext uri="{9D8B030D-6E8A-4147-A177-3AD203B41FA5}">
-                      <a16:colId xmlns="" xmlns:a16="http://schemas.microsoft.com/office/drawing/2014/main" val="916757565"/>
+                      <a16:colId xmlns:a16="http://schemas.microsoft.com/office/drawing/2014/main" xmlns="" val="916757565"/>
                     </a:ext>
                   </a:extLst>
                 </a:gridCol>
                 <a:gridCol w="1219200">
                   <a:extLst>
                     <a:ext uri="{9D8B030D-6E8A-4147-A177-3AD203B41FA5}">
-                      <a16:colId xmlns="" xmlns:a16="http://schemas.microsoft.com/office/drawing/2014/main" val="2834856093"/>
+                      <a16:colId xmlns:a16="http://schemas.microsoft.com/office/drawing/2014/main" xmlns="" val="2834856093"/>
                     </a:ext>
                   </a:extLst>
                 </a:gridCol>
                 <a:gridCol w="1219200">
                   <a:extLst>
                     <a:ext uri="{9D8B030D-6E8A-4147-A177-3AD203B41FA5}">
-                      <a16:colId xmlns="" xmlns:a16="http://schemas.microsoft.com/office/drawing/2014/main" val="635755816"/>
+                      <a16:colId xmlns:a16="http://schemas.microsoft.com/office/drawing/2014/main" xmlns="" val="635755816"/>
                     </a:ext>
                   </a:extLst>
                 </a:gridCol>
                 <a:gridCol w="1219200">
                   <a:extLst>
                     <a:ext uri="{9D8B030D-6E8A-4147-A177-3AD203B41FA5}">
-                      <a16:colId xmlns="" xmlns:a16="http://schemas.microsoft.com/office/drawing/2014/main" val="1972398041"/>
+                      <a16:colId xmlns:a16="http://schemas.microsoft.com/office/drawing/2014/main" xmlns="" val="1972398041"/>
                     </a:ext>
                   </a:extLst>
                 </a:gridCol>
@@ -38416,7 +38416,7 @@
                 </a:tc>
                 <a:extLst>
                   <a:ext uri="{0D108BD9-81ED-4DB2-BD59-A6C34878D82A}">
-                    <a16:rowId xmlns="" xmlns:a16="http://schemas.microsoft.com/office/drawing/2014/main" val="1849761393"/>
+                    <a16:rowId xmlns:a16="http://schemas.microsoft.com/office/drawing/2014/main" xmlns="" val="1849761393"/>
                   </a:ext>
                 </a:extLst>
               </a:tr>
@@ -38488,7 +38488,7 @@
                 </a:tc>
                 <a:extLst>
                   <a:ext uri="{0D108BD9-81ED-4DB2-BD59-A6C34878D82A}">
-                    <a16:rowId xmlns="" xmlns:a16="http://schemas.microsoft.com/office/drawing/2014/main" val="3717898675"/>
+                    <a16:rowId xmlns:a16="http://schemas.microsoft.com/office/drawing/2014/main" xmlns="" val="3717898675"/>
                   </a:ext>
                 </a:extLst>
               </a:tr>
@@ -38560,7 +38560,7 @@
                 </a:tc>
                 <a:extLst>
                   <a:ext uri="{0D108BD9-81ED-4DB2-BD59-A6C34878D82A}">
-                    <a16:rowId xmlns="" xmlns:a16="http://schemas.microsoft.com/office/drawing/2014/main" val="2567046546"/>
+                    <a16:rowId xmlns:a16="http://schemas.microsoft.com/office/drawing/2014/main" xmlns="" val="2567046546"/>
                   </a:ext>
                 </a:extLst>
               </a:tr>
@@ -38632,7 +38632,7 @@
                 </a:tc>
                 <a:extLst>
                   <a:ext uri="{0D108BD9-81ED-4DB2-BD59-A6C34878D82A}">
-                    <a16:rowId xmlns="" xmlns:a16="http://schemas.microsoft.com/office/drawing/2014/main" val="2877996339"/>
+                    <a16:rowId xmlns:a16="http://schemas.microsoft.com/office/drawing/2014/main" xmlns="" val="2877996339"/>
                   </a:ext>
                 </a:extLst>
               </a:tr>
@@ -38704,7 +38704,7 @@
                 </a:tc>
                 <a:extLst>
                   <a:ext uri="{0D108BD9-81ED-4DB2-BD59-A6C34878D82A}">
-                    <a16:rowId xmlns="" xmlns:a16="http://schemas.microsoft.com/office/drawing/2014/main" val="902591187"/>
+                    <a16:rowId xmlns:a16="http://schemas.microsoft.com/office/drawing/2014/main" xmlns="" val="902591187"/>
                   </a:ext>
                 </a:extLst>
               </a:tr>
@@ -38776,7 +38776,7 @@
                 </a:tc>
                 <a:extLst>
                   <a:ext uri="{0D108BD9-81ED-4DB2-BD59-A6C34878D82A}">
-                    <a16:rowId xmlns="" xmlns:a16="http://schemas.microsoft.com/office/drawing/2014/main" val="1535932179"/>
+                    <a16:rowId xmlns:a16="http://schemas.microsoft.com/office/drawing/2014/main" xmlns="" val="1535932179"/>
                   </a:ext>
                 </a:extLst>
               </a:tr>
@@ -38848,7 +38848,7 @@
                 </a:tc>
                 <a:extLst>
                   <a:ext uri="{0D108BD9-81ED-4DB2-BD59-A6C34878D82A}">
-                    <a16:rowId xmlns="" xmlns:a16="http://schemas.microsoft.com/office/drawing/2014/main" val="2723396167"/>
+                    <a16:rowId xmlns:a16="http://schemas.microsoft.com/office/drawing/2014/main" xmlns="" val="2723396167"/>
                   </a:ext>
                 </a:extLst>
               </a:tr>
@@ -38920,7 +38920,7 @@
                 </a:tc>
                 <a:extLst>
                   <a:ext uri="{0D108BD9-81ED-4DB2-BD59-A6C34878D82A}">
-                    <a16:rowId xmlns="" xmlns:a16="http://schemas.microsoft.com/office/drawing/2014/main" val="2986539505"/>
+                    <a16:rowId xmlns:a16="http://schemas.microsoft.com/office/drawing/2014/main" xmlns="" val="2986539505"/>
                   </a:ext>
                 </a:extLst>
               </a:tr>
@@ -38992,7 +38992,7 @@
                 </a:tc>
                 <a:extLst>
                   <a:ext uri="{0D108BD9-81ED-4DB2-BD59-A6C34878D82A}">
-                    <a16:rowId xmlns="" xmlns:a16="http://schemas.microsoft.com/office/drawing/2014/main" val="943896595"/>
+                    <a16:rowId xmlns:a16="http://schemas.microsoft.com/office/drawing/2014/main" xmlns="" val="943896595"/>
                   </a:ext>
                 </a:extLst>
               </a:tr>
@@ -39064,7 +39064,7 @@
                 </a:tc>
                 <a:extLst>
                   <a:ext uri="{0D108BD9-81ED-4DB2-BD59-A6C34878D82A}">
-                    <a16:rowId xmlns="" xmlns:a16="http://schemas.microsoft.com/office/drawing/2014/main" val="3580461304"/>
+                    <a16:rowId xmlns:a16="http://schemas.microsoft.com/office/drawing/2014/main" xmlns="" val="3580461304"/>
                   </a:ext>
                 </a:extLst>
               </a:tr>
@@ -39136,7 +39136,7 @@
                 </a:tc>
                 <a:extLst>
                   <a:ext uri="{0D108BD9-81ED-4DB2-BD59-A6C34878D82A}">
-                    <a16:rowId xmlns="" xmlns:a16="http://schemas.microsoft.com/office/drawing/2014/main" val="2241904089"/>
+                    <a16:rowId xmlns:a16="http://schemas.microsoft.com/office/drawing/2014/main" xmlns="" val="2241904089"/>
                   </a:ext>
                 </a:extLst>
               </a:tr>
@@ -39208,7 +39208,7 @@
                 </a:tc>
                 <a:extLst>
                   <a:ext uri="{0D108BD9-81ED-4DB2-BD59-A6C34878D82A}">
-                    <a16:rowId xmlns="" xmlns:a16="http://schemas.microsoft.com/office/drawing/2014/main" val="3580469505"/>
+                    <a16:rowId xmlns:a16="http://schemas.microsoft.com/office/drawing/2014/main" xmlns="" val="3580469505"/>
                   </a:ext>
                 </a:extLst>
               </a:tr>
@@ -39280,7 +39280,7 @@
                 </a:tc>
                 <a:extLst>
                   <a:ext uri="{0D108BD9-81ED-4DB2-BD59-A6C34878D82A}">
-                    <a16:rowId xmlns="" xmlns:a16="http://schemas.microsoft.com/office/drawing/2014/main" val="2518437508"/>
+                    <a16:rowId xmlns:a16="http://schemas.microsoft.com/office/drawing/2014/main" xmlns="" val="2518437508"/>
                   </a:ext>
                 </a:extLst>
               </a:tr>
@@ -39352,7 +39352,7 @@
                 </a:tc>
                 <a:extLst>
                   <a:ext uri="{0D108BD9-81ED-4DB2-BD59-A6C34878D82A}">
-                    <a16:rowId xmlns="" xmlns:a16="http://schemas.microsoft.com/office/drawing/2014/main" val="2487666978"/>
+                    <a16:rowId xmlns:a16="http://schemas.microsoft.com/office/drawing/2014/main" xmlns="" val="2487666978"/>
                   </a:ext>
                 </a:extLst>
               </a:tr>
@@ -39424,7 +39424,7 @@
                 </a:tc>
                 <a:extLst>
                   <a:ext uri="{0D108BD9-81ED-4DB2-BD59-A6C34878D82A}">
-                    <a16:rowId xmlns="" xmlns:a16="http://schemas.microsoft.com/office/drawing/2014/main" val="3638596052"/>
+                    <a16:rowId xmlns:a16="http://schemas.microsoft.com/office/drawing/2014/main" xmlns="" val="3638596052"/>
                   </a:ext>
                 </a:extLst>
               </a:tr>
@@ -40150,14 +40150,14 @@
               <ma14:placeholderFlag xmlns:ma14="http://schemas.microsoft.com/office/mac/drawingml/2011/main" val="1"/>
             </a:ext>
             <a:ext uri="{909E8E84-426E-40dd-AFC4-6F175D3DCCD1}">
-              <a14:hiddenFill xmlns:a14="http://schemas.microsoft.com/office/drawing/2010/main" xmlns="">
+              <a14:hiddenFill xmlns="" xmlns:a14="http://schemas.microsoft.com/office/drawing/2010/main">
                 <a:solidFill>
                   <a:schemeClr val="accent1"/>
                 </a:solidFill>
               </a14:hiddenFill>
             </a:ext>
             <a:ext uri="{91240B29-F687-4f45-9708-019B960494DF}">
-              <a14:hiddenLine xmlns:a14="http://schemas.microsoft.com/office/drawing/2010/main" xmlns="" w="9525">
+              <a14:hiddenLine xmlns="" xmlns:a14="http://schemas.microsoft.com/office/drawing/2010/main" w="9525">
                 <a:solidFill>
                   <a:schemeClr val="tx1"/>
                 </a:solidFill>
@@ -40167,7 +40167,7 @@
               </a14:hiddenLine>
             </a:ext>
             <a:ext uri="{AF507438-7753-43e0-B8FC-AC1667EBCBE1}">
-              <a14:hiddenEffects xmlns:a14="http://schemas.microsoft.com/office/drawing/2010/main" xmlns="">
+              <a14:hiddenEffects xmlns="" xmlns:a14="http://schemas.microsoft.com/office/drawing/2010/main">
                 <a:effectLst>
                   <a:outerShdw blurRad="63500" dist="38099" dir="2700000" algn="ctr" rotWithShape="0">
                     <a:schemeClr val="bg2">
@@ -40615,12 +40615,12 @@
               <a:t>Drop </a:t>
             </a:r>
             <a:r>
-              <a:rPr lang="en-US" dirty="0" err="1"/>
-              <a:t>uneeded</a:t>
+              <a:rPr lang="en-US" dirty="0" smtClean="0"/>
+              <a:t>unneeded </a:t>
             </a:r>
             <a:r>
               <a:rPr lang="en-US" dirty="0"/>
-              <a:t> columns / </a:t>
+              <a:t>columns / </a:t>
             </a:r>
             <a:r>
               <a:rPr lang="en-US" dirty="0" smtClean="0"/>
@@ -40717,12 +40717,8 @@
           <a:p>
             <a:pPr lvl="1"/>
             <a:r>
-              <a:rPr lang="en-US" smtClean="0"/>
-              <a:t>Split </a:t>
-            </a:r>
-            <a:r>
               <a:rPr lang="en-US" dirty="0" smtClean="0"/>
-              <a:t>90</a:t>
+              <a:t>Split 90</a:t>
             </a:r>
             <a:r>
               <a:rPr lang="en-US" dirty="0"/>

</xml_diff>